<commit_message>
naming and cleanup, working on TB
</commit_message>
<xml_diff>
--- a/Asynchronous FIFO.pptx
+++ b/Asynchronous FIFO.pptx
@@ -9,6 +9,10 @@
     <p:sldId id="257" r:id="rId3"/>
     <p:sldId id="259" r:id="rId4"/>
     <p:sldId id="258" r:id="rId5"/>
+    <p:sldId id="260" r:id="rId6"/>
+    <p:sldId id="263" r:id="rId7"/>
+    <p:sldId id="261" r:id="rId8"/>
+    <p:sldId id="262" r:id="rId9"/>
   </p:sldIdLst>
   <p:sldSz cx="12192000" cy="6858000"/>
   <p:notesSz cx="6858000" cy="9144000"/>
@@ -107,6 +111,11 @@
       </a:defRPr>
     </a:lvl9pPr>
   </p:defaultTextStyle>
+  <p:extLst>
+    <p:ext uri="{EFAFB233-063F-42B5-8137-9DF3F51BA10A}">
+      <p15:sldGuideLst xmlns:p15="http://schemas.microsoft.com/office/powerpoint/2012/main"/>
+    </p:ext>
+  </p:extLst>
 </p:presentation>
 </file>
 
@@ -243,7 +252,7 @@
           <a:p>
             <a:fld id="{CB5FA825-F155-4B9C-8354-B591564874AC}" type="datetimeFigureOut">
               <a:rPr lang="en-US" smtClean="0"/>
-              <a:t>5/4/2017</a:t>
+              <a:t>5/7/2017</a:t>
             </a:fld>
             <a:endParaRPr lang="en-US" dirty="0"/>
           </a:p>
@@ -411,7 +420,7 @@
           <a:p>
             <a:fld id="{CB5FA825-F155-4B9C-8354-B591564874AC}" type="datetimeFigureOut">
               <a:rPr lang="en-US" smtClean="0"/>
-              <a:t>5/4/2017</a:t>
+              <a:t>5/7/2017</a:t>
             </a:fld>
             <a:endParaRPr lang="en-US" dirty="0"/>
           </a:p>
@@ -589,7 +598,7 @@
           <a:p>
             <a:fld id="{CB5FA825-F155-4B9C-8354-B591564874AC}" type="datetimeFigureOut">
               <a:rPr lang="en-US" smtClean="0"/>
-              <a:t>5/4/2017</a:t>
+              <a:t>5/7/2017</a:t>
             </a:fld>
             <a:endParaRPr lang="en-US" dirty="0"/>
           </a:p>
@@ -757,7 +766,7 @@
           <a:p>
             <a:fld id="{CB5FA825-F155-4B9C-8354-B591564874AC}" type="datetimeFigureOut">
               <a:rPr lang="en-US" smtClean="0"/>
-              <a:t>5/4/2017</a:t>
+              <a:t>5/7/2017</a:t>
             </a:fld>
             <a:endParaRPr lang="en-US" dirty="0"/>
           </a:p>
@@ -1002,7 +1011,7 @@
           <a:p>
             <a:fld id="{CB5FA825-F155-4B9C-8354-B591564874AC}" type="datetimeFigureOut">
               <a:rPr lang="en-US" smtClean="0"/>
-              <a:t>5/4/2017</a:t>
+              <a:t>5/7/2017</a:t>
             </a:fld>
             <a:endParaRPr lang="en-US" dirty="0"/>
           </a:p>
@@ -1231,7 +1240,7 @@
           <a:p>
             <a:fld id="{CB5FA825-F155-4B9C-8354-B591564874AC}" type="datetimeFigureOut">
               <a:rPr lang="en-US" smtClean="0"/>
-              <a:t>5/4/2017</a:t>
+              <a:t>5/7/2017</a:t>
             </a:fld>
             <a:endParaRPr lang="en-US" dirty="0"/>
           </a:p>
@@ -1595,7 +1604,7 @@
           <a:p>
             <a:fld id="{CB5FA825-F155-4B9C-8354-B591564874AC}" type="datetimeFigureOut">
               <a:rPr lang="en-US" smtClean="0"/>
-              <a:t>5/4/2017</a:t>
+              <a:t>5/7/2017</a:t>
             </a:fld>
             <a:endParaRPr lang="en-US" dirty="0"/>
           </a:p>
@@ -1712,7 +1721,7 @@
           <a:p>
             <a:fld id="{CB5FA825-F155-4B9C-8354-B591564874AC}" type="datetimeFigureOut">
               <a:rPr lang="en-US" smtClean="0"/>
-              <a:t>5/4/2017</a:t>
+              <a:t>5/7/2017</a:t>
             </a:fld>
             <a:endParaRPr lang="en-US" dirty="0"/>
           </a:p>
@@ -1807,7 +1816,7 @@
           <a:p>
             <a:fld id="{CB5FA825-F155-4B9C-8354-B591564874AC}" type="datetimeFigureOut">
               <a:rPr lang="en-US" smtClean="0"/>
-              <a:t>5/4/2017</a:t>
+              <a:t>5/7/2017</a:t>
             </a:fld>
             <a:endParaRPr lang="en-US" dirty="0"/>
           </a:p>
@@ -2082,7 +2091,7 @@
           <a:p>
             <a:fld id="{CB5FA825-F155-4B9C-8354-B591564874AC}" type="datetimeFigureOut">
               <a:rPr lang="en-US" smtClean="0"/>
-              <a:t>5/4/2017</a:t>
+              <a:t>5/7/2017</a:t>
             </a:fld>
             <a:endParaRPr lang="en-US" dirty="0"/>
           </a:p>
@@ -2334,7 +2343,7 @@
           <a:p>
             <a:fld id="{CB5FA825-F155-4B9C-8354-B591564874AC}" type="datetimeFigureOut">
               <a:rPr lang="en-US" smtClean="0"/>
-              <a:t>5/4/2017</a:t>
+              <a:t>5/7/2017</a:t>
             </a:fld>
             <a:endParaRPr lang="en-US" dirty="0"/>
           </a:p>
@@ -2545,7 +2554,7 @@
           <a:p>
             <a:fld id="{CB5FA825-F155-4B9C-8354-B591564874AC}" type="datetimeFigureOut">
               <a:rPr lang="en-US" smtClean="0"/>
-              <a:t>5/4/2017</a:t>
+              <a:t>5/7/2017</a:t>
             </a:fld>
             <a:endParaRPr lang="en-US" dirty="0"/>
           </a:p>
@@ -3204,7 +3213,7 @@
       </p:sp>
       <p:sp>
         <p:nvSpPr>
-          <p:cNvPr id="3" name="Content Placeholder 2"/>
+          <p:cNvPr id="11" name="Content Placeholder 10"/>
           <p:cNvSpPr>
             <a:spLocks noGrp="1"/>
           </p:cNvSpPr>
@@ -3217,7 +3226,7 @@
           <a:bodyPr/>
           <a:lstStyle/>
           <a:p>
-            <a:endParaRPr lang="en-US" dirty="0"/>
+            <a:endParaRPr lang="en-US"/>
           </a:p>
         </p:txBody>
       </p:sp>
@@ -3225,6 +3234,436 @@
     <p:extLst>
       <p:ext uri="{BB962C8B-B14F-4D97-AF65-F5344CB8AC3E}">
         <p14:creationId xmlns:p14="http://schemas.microsoft.com/office/powerpoint/2010/main" val="3684913482"/>
+      </p:ext>
+    </p:extLst>
+  </p:cSld>
+  <p:clrMapOvr>
+    <a:masterClrMapping/>
+  </p:clrMapOvr>
+</p:sld>
+</file>
+
+<file path=ppt/slides/slide5.xml><?xml version="1.0" encoding="utf-8"?>
+<p:sld xmlns:a="http://schemas.openxmlformats.org/drawingml/2006/main" xmlns:r="http://schemas.openxmlformats.org/officeDocument/2006/relationships" xmlns:p="http://schemas.openxmlformats.org/presentationml/2006/main">
+  <p:cSld>
+    <p:spTree>
+      <p:nvGrpSpPr>
+        <p:cNvPr id="1" name=""/>
+        <p:cNvGrpSpPr/>
+        <p:nvPr/>
+      </p:nvGrpSpPr>
+      <p:grpSpPr>
+        <a:xfrm>
+          <a:off x="0" y="0"/>
+          <a:ext cx="0" cy="0"/>
+          <a:chOff x="0" y="0"/>
+          <a:chExt cx="0" cy="0"/>
+        </a:xfrm>
+      </p:grpSpPr>
+      <p:sp>
+        <p:nvSpPr>
+          <p:cNvPr id="2" name="Title 1"/>
+          <p:cNvSpPr>
+            <a:spLocks noGrp="1"/>
+          </p:cNvSpPr>
+          <p:nvPr>
+            <p:ph type="title"/>
+          </p:nvPr>
+        </p:nvSpPr>
+        <p:spPr/>
+        <p:txBody>
+          <a:bodyPr/>
+          <a:lstStyle/>
+          <a:p>
+            <a:endParaRPr lang="en-US" dirty="0"/>
+          </a:p>
+        </p:txBody>
+      </p:sp>
+      <p:sp>
+        <p:nvSpPr>
+          <p:cNvPr id="3" name="Content Placeholder 2"/>
+          <p:cNvSpPr>
+            <a:spLocks noGrp="1"/>
+          </p:cNvSpPr>
+          <p:nvPr>
+            <p:ph idx="1"/>
+          </p:nvPr>
+        </p:nvSpPr>
+        <p:spPr/>
+        <p:txBody>
+          <a:bodyPr/>
+          <a:lstStyle/>
+          <a:p>
+            <a:endParaRPr lang="en-US" dirty="0"/>
+          </a:p>
+        </p:txBody>
+      </p:sp>
+      <p:pic>
+        <p:nvPicPr>
+          <p:cNvPr id="4" name="Picture 3"/>
+          <p:cNvPicPr>
+            <a:picLocks noChangeAspect="1"/>
+          </p:cNvPicPr>
+          <p:nvPr/>
+        </p:nvPicPr>
+        <p:blipFill>
+          <a:blip r:embed="rId2"/>
+          <a:stretch>
+            <a:fillRect/>
+          </a:stretch>
+        </p:blipFill>
+        <p:spPr>
+          <a:xfrm>
+            <a:off x="4755593" y="729369"/>
+            <a:ext cx="6598207" cy="2859525"/>
+          </a:xfrm>
+          <a:prstGeom prst="rect">
+            <a:avLst/>
+          </a:prstGeom>
+        </p:spPr>
+      </p:pic>
+      <p:pic>
+        <p:nvPicPr>
+          <p:cNvPr id="5" name="Picture 4"/>
+          <p:cNvPicPr>
+            <a:picLocks noChangeAspect="1"/>
+          </p:cNvPicPr>
+          <p:nvPr/>
+        </p:nvPicPr>
+        <p:blipFill>
+          <a:blip r:embed="rId3"/>
+          <a:stretch>
+            <a:fillRect/>
+          </a:stretch>
+        </p:blipFill>
+        <p:spPr>
+          <a:xfrm>
+            <a:off x="4781937" y="3420943"/>
+            <a:ext cx="6574971" cy="2588069"/>
+          </a:xfrm>
+          <a:prstGeom prst="rect">
+            <a:avLst/>
+          </a:prstGeom>
+        </p:spPr>
+      </p:pic>
+    </p:spTree>
+    <p:extLst>
+      <p:ext uri="{BB962C8B-B14F-4D97-AF65-F5344CB8AC3E}">
+        <p14:creationId xmlns:p14="http://schemas.microsoft.com/office/powerpoint/2010/main" val="2849909054"/>
+      </p:ext>
+    </p:extLst>
+  </p:cSld>
+  <p:clrMapOvr>
+    <a:masterClrMapping/>
+  </p:clrMapOvr>
+</p:sld>
+</file>
+
+<file path=ppt/slides/slide6.xml><?xml version="1.0" encoding="utf-8"?>
+<p:sld xmlns:a="http://schemas.openxmlformats.org/drawingml/2006/main" xmlns:r="http://schemas.openxmlformats.org/officeDocument/2006/relationships" xmlns:p="http://schemas.openxmlformats.org/presentationml/2006/main">
+  <p:cSld>
+    <p:spTree>
+      <p:nvGrpSpPr>
+        <p:cNvPr id="1" name=""/>
+        <p:cNvGrpSpPr/>
+        <p:nvPr/>
+      </p:nvGrpSpPr>
+      <p:grpSpPr>
+        <a:xfrm>
+          <a:off x="0" y="0"/>
+          <a:ext cx="0" cy="0"/>
+          <a:chOff x="0" y="0"/>
+          <a:chExt cx="0" cy="0"/>
+        </a:xfrm>
+      </p:grpSpPr>
+      <p:sp>
+        <p:nvSpPr>
+          <p:cNvPr id="2" name="Title 1"/>
+          <p:cNvSpPr>
+            <a:spLocks noGrp="1"/>
+          </p:cNvSpPr>
+          <p:nvPr>
+            <p:ph type="title"/>
+          </p:nvPr>
+        </p:nvSpPr>
+        <p:spPr/>
+        <p:txBody>
+          <a:bodyPr/>
+          <a:lstStyle/>
+          <a:p>
+            <a:r>
+              <a:rPr lang="nb-NO" dirty="0"/>
+              <a:t>65536</a:t>
+            </a:r>
+            <a:endParaRPr lang="en-US" dirty="0"/>
+          </a:p>
+        </p:txBody>
+      </p:sp>
+      <p:sp>
+        <p:nvSpPr>
+          <p:cNvPr id="3" name="Content Placeholder 2"/>
+          <p:cNvSpPr>
+            <a:spLocks noGrp="1"/>
+          </p:cNvSpPr>
+          <p:nvPr>
+            <p:ph idx="1"/>
+          </p:nvPr>
+        </p:nvSpPr>
+        <p:spPr/>
+        <p:txBody>
+          <a:bodyPr/>
+          <a:lstStyle/>
+          <a:p>
+            <a:endParaRPr lang="en-US"/>
+          </a:p>
+        </p:txBody>
+      </p:sp>
+      <p:pic>
+        <p:nvPicPr>
+          <p:cNvPr id="4" name="Picture 3"/>
+          <p:cNvPicPr>
+            <a:picLocks noChangeAspect="1"/>
+          </p:cNvPicPr>
+          <p:nvPr/>
+        </p:nvPicPr>
+        <p:blipFill>
+          <a:blip r:embed="rId2"/>
+          <a:stretch>
+            <a:fillRect/>
+          </a:stretch>
+        </p:blipFill>
+        <p:spPr>
+          <a:xfrm>
+            <a:off x="9405257" y="0"/>
+            <a:ext cx="2655020" cy="5437822"/>
+          </a:xfrm>
+          <a:prstGeom prst="rect">
+            <a:avLst/>
+          </a:prstGeom>
+        </p:spPr>
+      </p:pic>
+      <p:pic>
+        <p:nvPicPr>
+          <p:cNvPr id="5" name="Picture 4"/>
+          <p:cNvPicPr>
+            <a:picLocks noChangeAspect="1"/>
+          </p:cNvPicPr>
+          <p:nvPr/>
+        </p:nvPicPr>
+        <p:blipFill>
+          <a:blip r:embed="rId3"/>
+          <a:stretch>
+            <a:fillRect/>
+          </a:stretch>
+        </p:blipFill>
+        <p:spPr>
+          <a:xfrm>
+            <a:off x="0" y="5373077"/>
+            <a:ext cx="12192000" cy="1484923"/>
+          </a:xfrm>
+          <a:prstGeom prst="rect">
+            <a:avLst/>
+          </a:prstGeom>
+        </p:spPr>
+      </p:pic>
+    </p:spTree>
+    <p:extLst>
+      <p:ext uri="{BB962C8B-B14F-4D97-AF65-F5344CB8AC3E}">
+        <p14:creationId xmlns:p14="http://schemas.microsoft.com/office/powerpoint/2010/main" val="3834957508"/>
+      </p:ext>
+    </p:extLst>
+  </p:cSld>
+  <p:clrMapOvr>
+    <a:masterClrMapping/>
+  </p:clrMapOvr>
+</p:sld>
+</file>
+
+<file path=ppt/slides/slide7.xml><?xml version="1.0" encoding="utf-8"?>
+<p:sld xmlns:a="http://schemas.openxmlformats.org/drawingml/2006/main" xmlns:r="http://schemas.openxmlformats.org/officeDocument/2006/relationships" xmlns:p="http://schemas.openxmlformats.org/presentationml/2006/main">
+  <p:cSld>
+    <p:spTree>
+      <p:nvGrpSpPr>
+        <p:cNvPr id="1" name=""/>
+        <p:cNvGrpSpPr/>
+        <p:nvPr/>
+      </p:nvGrpSpPr>
+      <p:grpSpPr>
+        <a:xfrm>
+          <a:off x="0" y="0"/>
+          <a:ext cx="0" cy="0"/>
+          <a:chOff x="0" y="0"/>
+          <a:chExt cx="0" cy="0"/>
+        </a:xfrm>
+      </p:grpSpPr>
+      <p:sp>
+        <p:nvSpPr>
+          <p:cNvPr id="2" name="Title 1"/>
+          <p:cNvSpPr>
+            <a:spLocks noGrp="1"/>
+          </p:cNvSpPr>
+          <p:nvPr>
+            <p:ph type="title"/>
+          </p:nvPr>
+        </p:nvSpPr>
+        <p:spPr/>
+        <p:txBody>
+          <a:bodyPr>
+            <a:normAutofit/>
+          </a:bodyPr>
+          <a:lstStyle/>
+          <a:p>
+            <a:r>
+              <a:rPr lang="nb-NO" dirty="0"/>
+              <a:t>Critical path BUFFER_SIZE 8</a:t>
+            </a:r>
+            <a:endParaRPr lang="en-US" dirty="0"/>
+          </a:p>
+        </p:txBody>
+      </p:sp>
+      <p:sp>
+        <p:nvSpPr>
+          <p:cNvPr id="3" name="Content Placeholder 2"/>
+          <p:cNvSpPr>
+            <a:spLocks noGrp="1"/>
+          </p:cNvSpPr>
+          <p:nvPr>
+            <p:ph idx="1"/>
+          </p:nvPr>
+        </p:nvSpPr>
+        <p:spPr/>
+        <p:txBody>
+          <a:bodyPr/>
+          <a:lstStyle/>
+          <a:p>
+            <a:endParaRPr lang="en-US"/>
+          </a:p>
+        </p:txBody>
+      </p:sp>
+      <p:pic>
+        <p:nvPicPr>
+          <p:cNvPr id="4" name="Picture 3"/>
+          <p:cNvPicPr>
+            <a:picLocks noChangeAspect="1"/>
+          </p:cNvPicPr>
+          <p:nvPr/>
+        </p:nvPicPr>
+        <p:blipFill>
+          <a:blip r:embed="rId2"/>
+          <a:stretch>
+            <a:fillRect/>
+          </a:stretch>
+        </p:blipFill>
+        <p:spPr>
+          <a:xfrm>
+            <a:off x="0" y="1533851"/>
+            <a:ext cx="12192000" cy="3790297"/>
+          </a:xfrm>
+          <a:prstGeom prst="rect">
+            <a:avLst/>
+          </a:prstGeom>
+        </p:spPr>
+      </p:pic>
+    </p:spTree>
+    <p:extLst>
+      <p:ext uri="{BB962C8B-B14F-4D97-AF65-F5344CB8AC3E}">
+        <p14:creationId xmlns:p14="http://schemas.microsoft.com/office/powerpoint/2010/main" val="1849489438"/>
+      </p:ext>
+    </p:extLst>
+  </p:cSld>
+  <p:clrMapOvr>
+    <a:masterClrMapping/>
+  </p:clrMapOvr>
+</p:sld>
+</file>
+
+<file path=ppt/slides/slide8.xml><?xml version="1.0" encoding="utf-8"?>
+<p:sld xmlns:a="http://schemas.openxmlformats.org/drawingml/2006/main" xmlns:r="http://schemas.openxmlformats.org/officeDocument/2006/relationships" xmlns:p="http://schemas.openxmlformats.org/presentationml/2006/main">
+  <p:cSld>
+    <p:spTree>
+      <p:nvGrpSpPr>
+        <p:cNvPr id="1" name=""/>
+        <p:cNvGrpSpPr/>
+        <p:nvPr/>
+      </p:nvGrpSpPr>
+      <p:grpSpPr>
+        <a:xfrm>
+          <a:off x="0" y="0"/>
+          <a:ext cx="0" cy="0"/>
+          <a:chOff x="0" y="0"/>
+          <a:chExt cx="0" cy="0"/>
+        </a:xfrm>
+      </p:grpSpPr>
+      <p:sp>
+        <p:nvSpPr>
+          <p:cNvPr id="2" name="Title 1"/>
+          <p:cNvSpPr>
+            <a:spLocks noGrp="1"/>
+          </p:cNvSpPr>
+          <p:nvPr>
+            <p:ph type="title"/>
+          </p:nvPr>
+        </p:nvSpPr>
+        <p:spPr/>
+        <p:txBody>
+          <a:bodyPr/>
+          <a:lstStyle/>
+          <a:p>
+            <a:r>
+              <a:rPr lang="nb-NO" dirty="0"/>
+              <a:t>Critical path BUFFER_SIZE 128</a:t>
+            </a:r>
+            <a:endParaRPr lang="en-US" dirty="0"/>
+          </a:p>
+        </p:txBody>
+      </p:sp>
+      <p:sp>
+        <p:nvSpPr>
+          <p:cNvPr id="3" name="Content Placeholder 2"/>
+          <p:cNvSpPr>
+            <a:spLocks noGrp="1"/>
+          </p:cNvSpPr>
+          <p:nvPr>
+            <p:ph idx="1"/>
+          </p:nvPr>
+        </p:nvSpPr>
+        <p:spPr/>
+        <p:txBody>
+          <a:bodyPr/>
+          <a:lstStyle/>
+          <a:p>
+            <a:endParaRPr lang="en-US"/>
+          </a:p>
+        </p:txBody>
+      </p:sp>
+      <p:pic>
+        <p:nvPicPr>
+          <p:cNvPr id="4" name="Picture 3"/>
+          <p:cNvPicPr>
+            <a:picLocks noChangeAspect="1"/>
+          </p:cNvPicPr>
+          <p:nvPr/>
+        </p:nvPicPr>
+        <p:blipFill>
+          <a:blip r:embed="rId2"/>
+          <a:stretch>
+            <a:fillRect/>
+          </a:stretch>
+        </p:blipFill>
+        <p:spPr>
+          <a:xfrm>
+            <a:off x="0" y="1819684"/>
+            <a:ext cx="12192000" cy="3218631"/>
+          </a:xfrm>
+          <a:prstGeom prst="rect">
+            <a:avLst/>
+          </a:prstGeom>
+        </p:spPr>
+      </p:pic>
+    </p:spTree>
+    <p:extLst>
+      <p:ext uri="{BB962C8B-B14F-4D97-AF65-F5344CB8AC3E}">
+        <p14:creationId xmlns:p14="http://schemas.microsoft.com/office/powerpoint/2010/main" val="2341190910"/>
       </p:ext>
     </p:extLst>
   </p:cSld>

</xml_diff>

<commit_message>
dual gray code pointers to avoid metastability
</commit_message>
<xml_diff>
--- a/Asynchronous FIFO.pptx
+++ b/Asynchronous FIFO.pptx
@@ -13,6 +13,7 @@
     <p:sldId id="263" r:id="rId7"/>
     <p:sldId id="261" r:id="rId8"/>
     <p:sldId id="262" r:id="rId9"/>
+    <p:sldId id="264" r:id="rId10"/>
   </p:sldIdLst>
   <p:sldSz cx="12192000" cy="6858000"/>
   <p:notesSz cx="6858000" cy="9144000"/>
@@ -252,7 +253,7 @@
           <a:p>
             <a:fld id="{CB5FA825-F155-4B9C-8354-B591564874AC}" type="datetimeFigureOut">
               <a:rPr lang="en-US" smtClean="0"/>
-              <a:t>5/7/2017</a:t>
+              <a:t>5/8/2017</a:t>
             </a:fld>
             <a:endParaRPr lang="en-US" dirty="0"/>
           </a:p>
@@ -420,7 +421,7 @@
           <a:p>
             <a:fld id="{CB5FA825-F155-4B9C-8354-B591564874AC}" type="datetimeFigureOut">
               <a:rPr lang="en-US" smtClean="0"/>
-              <a:t>5/7/2017</a:t>
+              <a:t>5/8/2017</a:t>
             </a:fld>
             <a:endParaRPr lang="en-US" dirty="0"/>
           </a:p>
@@ -598,7 +599,7 @@
           <a:p>
             <a:fld id="{CB5FA825-F155-4B9C-8354-B591564874AC}" type="datetimeFigureOut">
               <a:rPr lang="en-US" smtClean="0"/>
-              <a:t>5/7/2017</a:t>
+              <a:t>5/8/2017</a:t>
             </a:fld>
             <a:endParaRPr lang="en-US" dirty="0"/>
           </a:p>
@@ -766,7 +767,7 @@
           <a:p>
             <a:fld id="{CB5FA825-F155-4B9C-8354-B591564874AC}" type="datetimeFigureOut">
               <a:rPr lang="en-US" smtClean="0"/>
-              <a:t>5/7/2017</a:t>
+              <a:t>5/8/2017</a:t>
             </a:fld>
             <a:endParaRPr lang="en-US" dirty="0"/>
           </a:p>
@@ -1011,7 +1012,7 @@
           <a:p>
             <a:fld id="{CB5FA825-F155-4B9C-8354-B591564874AC}" type="datetimeFigureOut">
               <a:rPr lang="en-US" smtClean="0"/>
-              <a:t>5/7/2017</a:t>
+              <a:t>5/8/2017</a:t>
             </a:fld>
             <a:endParaRPr lang="en-US" dirty="0"/>
           </a:p>
@@ -1240,7 +1241,7 @@
           <a:p>
             <a:fld id="{CB5FA825-F155-4B9C-8354-B591564874AC}" type="datetimeFigureOut">
               <a:rPr lang="en-US" smtClean="0"/>
-              <a:t>5/7/2017</a:t>
+              <a:t>5/8/2017</a:t>
             </a:fld>
             <a:endParaRPr lang="en-US" dirty="0"/>
           </a:p>
@@ -1604,7 +1605,7 @@
           <a:p>
             <a:fld id="{CB5FA825-F155-4B9C-8354-B591564874AC}" type="datetimeFigureOut">
               <a:rPr lang="en-US" smtClean="0"/>
-              <a:t>5/7/2017</a:t>
+              <a:t>5/8/2017</a:t>
             </a:fld>
             <a:endParaRPr lang="en-US" dirty="0"/>
           </a:p>
@@ -1721,7 +1722,7 @@
           <a:p>
             <a:fld id="{CB5FA825-F155-4B9C-8354-B591564874AC}" type="datetimeFigureOut">
               <a:rPr lang="en-US" smtClean="0"/>
-              <a:t>5/7/2017</a:t>
+              <a:t>5/8/2017</a:t>
             </a:fld>
             <a:endParaRPr lang="en-US" dirty="0"/>
           </a:p>
@@ -1816,7 +1817,7 @@
           <a:p>
             <a:fld id="{CB5FA825-F155-4B9C-8354-B591564874AC}" type="datetimeFigureOut">
               <a:rPr lang="en-US" smtClean="0"/>
-              <a:t>5/7/2017</a:t>
+              <a:t>5/8/2017</a:t>
             </a:fld>
             <a:endParaRPr lang="en-US" dirty="0"/>
           </a:p>
@@ -2091,7 +2092,7 @@
           <a:p>
             <a:fld id="{CB5FA825-F155-4B9C-8354-B591564874AC}" type="datetimeFigureOut">
               <a:rPr lang="en-US" smtClean="0"/>
-              <a:t>5/7/2017</a:t>
+              <a:t>5/8/2017</a:t>
             </a:fld>
             <a:endParaRPr lang="en-US" dirty="0"/>
           </a:p>
@@ -2343,7 +2344,7 @@
           <a:p>
             <a:fld id="{CB5FA825-F155-4B9C-8354-B591564874AC}" type="datetimeFigureOut">
               <a:rPr lang="en-US" smtClean="0"/>
-              <a:t>5/7/2017</a:t>
+              <a:t>5/8/2017</a:t>
             </a:fld>
             <a:endParaRPr lang="en-US" dirty="0"/>
           </a:p>
@@ -2554,7 +2555,7 @@
           <a:p>
             <a:fld id="{CB5FA825-F155-4B9C-8354-B591564874AC}" type="datetimeFigureOut">
               <a:rPr lang="en-US" smtClean="0"/>
-              <a:t>5/7/2017</a:t>
+              <a:t>5/8/2017</a:t>
             </a:fld>
             <a:endParaRPr lang="en-US" dirty="0"/>
           </a:p>
@@ -3673,6 +3674,102 @@
 </p:sld>
 </file>
 
+<file path=ppt/slides/slide9.xml><?xml version="1.0" encoding="utf-8"?>
+<p:sld xmlns:a="http://schemas.openxmlformats.org/drawingml/2006/main" xmlns:r="http://schemas.openxmlformats.org/officeDocument/2006/relationships" xmlns:p="http://schemas.openxmlformats.org/presentationml/2006/main">
+  <p:cSld>
+    <p:spTree>
+      <p:nvGrpSpPr>
+        <p:cNvPr id="1" name=""/>
+        <p:cNvGrpSpPr/>
+        <p:nvPr/>
+      </p:nvGrpSpPr>
+      <p:grpSpPr>
+        <a:xfrm>
+          <a:off x="0" y="0"/>
+          <a:ext cx="0" cy="0"/>
+          <a:chOff x="0" y="0"/>
+          <a:chExt cx="0" cy="0"/>
+        </a:xfrm>
+      </p:grpSpPr>
+      <p:sp>
+        <p:nvSpPr>
+          <p:cNvPr id="2" name="Title 1"/>
+          <p:cNvSpPr>
+            <a:spLocks noGrp="1"/>
+          </p:cNvSpPr>
+          <p:nvPr>
+            <p:ph type="title"/>
+          </p:nvPr>
+        </p:nvSpPr>
+        <p:spPr/>
+        <p:txBody>
+          <a:bodyPr/>
+          <a:lstStyle/>
+          <a:p>
+            <a:r>
+              <a:rPr lang="nb-NO" dirty="0"/>
+              <a:t>RTL Analysis</a:t>
+            </a:r>
+            <a:endParaRPr lang="en-US" dirty="0"/>
+          </a:p>
+        </p:txBody>
+      </p:sp>
+      <p:sp>
+        <p:nvSpPr>
+          <p:cNvPr id="3" name="Content Placeholder 2"/>
+          <p:cNvSpPr>
+            <a:spLocks noGrp="1"/>
+          </p:cNvSpPr>
+          <p:nvPr>
+            <p:ph idx="1"/>
+          </p:nvPr>
+        </p:nvSpPr>
+        <p:spPr/>
+        <p:txBody>
+          <a:bodyPr/>
+          <a:lstStyle/>
+          <a:p>
+            <a:endParaRPr lang="en-US" dirty="0"/>
+          </a:p>
+        </p:txBody>
+      </p:sp>
+      <p:pic>
+        <p:nvPicPr>
+          <p:cNvPr id="4" name="Picture 3"/>
+          <p:cNvPicPr>
+            <a:picLocks noChangeAspect="1"/>
+          </p:cNvPicPr>
+          <p:nvPr/>
+        </p:nvPicPr>
+        <p:blipFill>
+          <a:blip r:embed="rId2"/>
+          <a:stretch>
+            <a:fillRect/>
+          </a:stretch>
+        </p:blipFill>
+        <p:spPr>
+          <a:xfrm>
+            <a:off x="0" y="1881904"/>
+            <a:ext cx="12192000" cy="3024343"/>
+          </a:xfrm>
+          <a:prstGeom prst="rect">
+            <a:avLst/>
+          </a:prstGeom>
+        </p:spPr>
+      </p:pic>
+    </p:spTree>
+    <p:extLst>
+      <p:ext uri="{BB962C8B-B14F-4D97-AF65-F5344CB8AC3E}">
+        <p14:creationId xmlns:p14="http://schemas.microsoft.com/office/powerpoint/2010/main" val="3150454462"/>
+      </p:ext>
+    </p:extLst>
+  </p:cSld>
+  <p:clrMapOvr>
+    <a:masterClrMapping/>
+  </p:clrMapOvr>
+</p:sld>
+</file>
+
 <file path=ppt/theme/theme1.xml><?xml version="1.0" encoding="utf-8"?>
 <a:theme xmlns:a="http://schemas.openxmlformats.org/drawingml/2006/main" name="Office Theme">
   <a:themeElements>

</xml_diff>

<commit_message>
presentation and minor comment on memory interface
</commit_message>
<xml_diff>
--- a/Asynchronous FIFO.pptx
+++ b/Asynchronous FIFO.pptx
@@ -8,18 +8,17 @@
     <p:sldId id="256" r:id="rId2"/>
     <p:sldId id="257" r:id="rId3"/>
     <p:sldId id="259" r:id="rId4"/>
-    <p:sldId id="270" r:id="rId5"/>
-    <p:sldId id="258" r:id="rId6"/>
+    <p:sldId id="258" r:id="rId5"/>
+    <p:sldId id="270" r:id="rId6"/>
     <p:sldId id="268" r:id="rId7"/>
     <p:sldId id="260" r:id="rId8"/>
     <p:sldId id="265" r:id="rId9"/>
-    <p:sldId id="266" r:id="rId10"/>
-    <p:sldId id="263" r:id="rId11"/>
-    <p:sldId id="261" r:id="rId12"/>
-    <p:sldId id="262" r:id="rId13"/>
-    <p:sldId id="264" r:id="rId14"/>
-    <p:sldId id="267" r:id="rId15"/>
-    <p:sldId id="269" r:id="rId16"/>
+    <p:sldId id="263" r:id="rId10"/>
+    <p:sldId id="261" r:id="rId11"/>
+    <p:sldId id="262" r:id="rId12"/>
+    <p:sldId id="264" r:id="rId13"/>
+    <p:sldId id="267" r:id="rId14"/>
+    <p:sldId id="269" r:id="rId15"/>
   </p:sldIdLst>
   <p:sldSz cx="12192000" cy="6858000"/>
   <p:notesSz cx="6858000" cy="9144000"/>
@@ -4061,12 +4060,14 @@
         </p:nvSpPr>
         <p:spPr/>
         <p:txBody>
-          <a:bodyPr/>
+          <a:bodyPr>
+            <a:normAutofit/>
+          </a:bodyPr>
           <a:lstStyle/>
           <a:p>
             <a:r>
               <a:rPr lang="nb-NO" dirty="0"/>
-              <a:t>65536</a:t>
+              <a:t>Critical path BUFFER_SIZE 8</a:t>
             </a:r>
             <a:endParaRPr lang="en-US" dirty="0"/>
           </a:p>
@@ -4091,34 +4092,10 @@
           </a:p>
         </p:txBody>
       </p:sp>
-      <p:pic>
-        <p:nvPicPr>
-          <p:cNvPr id="6" name="Picture 5"/>
-          <p:cNvPicPr>
-            <a:picLocks noChangeAspect="1"/>
-          </p:cNvPicPr>
-          <p:nvPr/>
-        </p:nvPicPr>
-        <p:blipFill>
-          <a:blip r:embed="rId2"/>
-          <a:stretch>
-            <a:fillRect/>
-          </a:stretch>
-        </p:blipFill>
-        <p:spPr>
-          <a:xfrm>
-            <a:off x="8976049" y="7667"/>
-            <a:ext cx="3215951" cy="6850333"/>
-          </a:xfrm>
-          <a:prstGeom prst="rect">
-            <a:avLst/>
-          </a:prstGeom>
-        </p:spPr>
-      </p:pic>
     </p:spTree>
     <p:extLst>
       <p:ext uri="{BB962C8B-B14F-4D97-AF65-F5344CB8AC3E}">
-        <p14:creationId xmlns:p14="http://schemas.microsoft.com/office/powerpoint/2010/main" val="3834957508"/>
+        <p14:creationId xmlns:p14="http://schemas.microsoft.com/office/powerpoint/2010/main" val="1849489438"/>
       </p:ext>
     </p:extLst>
   </p:cSld>
@@ -4157,14 +4134,12 @@
         </p:nvSpPr>
         <p:spPr/>
         <p:txBody>
-          <a:bodyPr>
-            <a:normAutofit/>
-          </a:bodyPr>
+          <a:bodyPr/>
           <a:lstStyle/>
           <a:p>
             <a:r>
               <a:rPr lang="nb-NO" dirty="0"/>
-              <a:t>Critical path BUFFER_SIZE 8</a:t>
+              <a:t>Critical path BUFFER_SIZE 128</a:t>
             </a:r>
             <a:endParaRPr lang="en-US" dirty="0"/>
           </a:p>
@@ -4185,14 +4160,14 @@
           <a:bodyPr/>
           <a:lstStyle/>
           <a:p>
-            <a:endParaRPr lang="en-US"/>
+            <a:endParaRPr lang="en-US" dirty="0"/>
           </a:p>
         </p:txBody>
       </p:sp>
     </p:spTree>
     <p:extLst>
       <p:ext uri="{BB962C8B-B14F-4D97-AF65-F5344CB8AC3E}">
-        <p14:creationId xmlns:p14="http://schemas.microsoft.com/office/powerpoint/2010/main" val="1849489438"/>
+        <p14:creationId xmlns:p14="http://schemas.microsoft.com/office/powerpoint/2010/main" val="2341190910"/>
       </p:ext>
     </p:extLst>
   </p:cSld>
@@ -4236,78 +4211,6 @@
           <a:p>
             <a:r>
               <a:rPr lang="nb-NO" dirty="0"/>
-              <a:t>Critical path BUFFER_SIZE 128</a:t>
-            </a:r>
-            <a:endParaRPr lang="en-US" dirty="0"/>
-          </a:p>
-        </p:txBody>
-      </p:sp>
-      <p:sp>
-        <p:nvSpPr>
-          <p:cNvPr id="3" name="Content Placeholder 2"/>
-          <p:cNvSpPr>
-            <a:spLocks noGrp="1"/>
-          </p:cNvSpPr>
-          <p:nvPr>
-            <p:ph idx="1"/>
-          </p:nvPr>
-        </p:nvSpPr>
-        <p:spPr/>
-        <p:txBody>
-          <a:bodyPr/>
-          <a:lstStyle/>
-          <a:p>
-            <a:endParaRPr lang="en-US" dirty="0"/>
-          </a:p>
-        </p:txBody>
-      </p:sp>
-    </p:spTree>
-    <p:extLst>
-      <p:ext uri="{BB962C8B-B14F-4D97-AF65-F5344CB8AC3E}">
-        <p14:creationId xmlns:p14="http://schemas.microsoft.com/office/powerpoint/2010/main" val="2341190910"/>
-      </p:ext>
-    </p:extLst>
-  </p:cSld>
-  <p:clrMapOvr>
-    <a:masterClrMapping/>
-  </p:clrMapOvr>
-</p:sld>
-</file>
-
-<file path=ppt/slides/slide13.xml><?xml version="1.0" encoding="utf-8"?>
-<p:sld xmlns:a="http://schemas.openxmlformats.org/drawingml/2006/main" xmlns:r="http://schemas.openxmlformats.org/officeDocument/2006/relationships" xmlns:p="http://schemas.openxmlformats.org/presentationml/2006/main">
-  <p:cSld>
-    <p:spTree>
-      <p:nvGrpSpPr>
-        <p:cNvPr id="1" name=""/>
-        <p:cNvGrpSpPr/>
-        <p:nvPr/>
-      </p:nvGrpSpPr>
-      <p:grpSpPr>
-        <a:xfrm>
-          <a:off x="0" y="0"/>
-          <a:ext cx="0" cy="0"/>
-          <a:chOff x="0" y="0"/>
-          <a:chExt cx="0" cy="0"/>
-        </a:xfrm>
-      </p:grpSpPr>
-      <p:sp>
-        <p:nvSpPr>
-          <p:cNvPr id="2" name="Title 1"/>
-          <p:cNvSpPr>
-            <a:spLocks noGrp="1"/>
-          </p:cNvSpPr>
-          <p:nvPr>
-            <p:ph type="title"/>
-          </p:nvPr>
-        </p:nvSpPr>
-        <p:spPr/>
-        <p:txBody>
-          <a:bodyPr/>
-          <a:lstStyle/>
-          <a:p>
-            <a:r>
-              <a:rPr lang="nb-NO" dirty="0"/>
               <a:t>RTL Analysis</a:t>
             </a:r>
             <a:endParaRPr lang="en-US" dirty="0"/>
@@ -4346,7 +4249,7 @@
 </p:sld>
 </file>
 
-<file path=ppt/slides/slide14.xml><?xml version="1.0" encoding="utf-8"?>
+<file path=ppt/slides/slide13.xml><?xml version="1.0" encoding="utf-8"?>
 <p:sld xmlns:a="http://schemas.openxmlformats.org/drawingml/2006/main" xmlns:r="http://schemas.openxmlformats.org/officeDocument/2006/relationships" xmlns:p="http://schemas.openxmlformats.org/presentationml/2006/main">
   <p:cSld>
     <p:spTree>
@@ -4438,7 +4341,7 @@
 </p:sld>
 </file>
 
-<file path=ppt/slides/slide15.xml><?xml version="1.0" encoding="utf-8"?>
+<file path=ppt/slides/slide14.xml><?xml version="1.0" encoding="utf-8"?>
 <p:sld xmlns:a="http://schemas.openxmlformats.org/drawingml/2006/main" xmlns:r="http://schemas.openxmlformats.org/officeDocument/2006/relationships" xmlns:p="http://schemas.openxmlformats.org/presentationml/2006/main">
   <p:cSld>
     <p:spTree>
@@ -4670,8 +4573,23 @@
         </p:nvSpPr>
         <p:spPr/>
         <p:txBody>
-          <a:bodyPr/>
-          <a:lstStyle/>
+          <a:bodyPr>
+            <a:normAutofit fontScale="70000" lnSpcReduction="20000"/>
+          </a:bodyPr>
+          <a:lstStyle/>
+          <a:p>
+            <a:r>
+              <a:rPr lang="nb-NO" dirty="0"/>
+              <a:t>Binary pointers passed directly</a:t>
+            </a:r>
+          </a:p>
+          <a:p>
+            <a:pPr lvl="1"/>
+            <a:r>
+              <a:rPr lang="nb-NO" dirty="0"/>
+              <a:t>Bad practice</a:t>
+            </a:r>
+          </a:p>
           <a:p>
             <a:r>
               <a:rPr lang="nb-NO" dirty="0"/>
@@ -4682,28 +4600,42 @@
             <a:pPr lvl="1"/>
             <a:r>
               <a:rPr lang="nb-NO" dirty="0"/>
-              <a:t>Safe</a:t>
+              <a:t>Safe and simple</a:t>
             </a:r>
           </a:p>
           <a:p>
             <a:pPr lvl="1"/>
             <a:r>
               <a:rPr lang="nb-NO" dirty="0"/>
-              <a:t>Simple</a:t>
+              <a:t>Supports any fifo depth, and arbitrary pointer changes</a:t>
             </a:r>
           </a:p>
           <a:p>
             <a:pPr lvl="1"/>
             <a:r>
               <a:rPr lang="nb-NO" dirty="0"/>
-              <a:t>Supports any fifo depth, and arbitrary pointer changes.</a:t>
+              <a:t>Easy full/empty/almost_full/almost_empty generation</a:t>
             </a:r>
           </a:p>
           <a:p>
             <a:pPr lvl="1"/>
             <a:r>
               <a:rPr lang="nb-NO" dirty="0"/>
-              <a:t>Easy full/empty generation</a:t>
+              <a:t>Smaller(2FF per pointer bits + 4 for REQ/ACK)</a:t>
+            </a:r>
+          </a:p>
+          <a:p>
+            <a:pPr lvl="1"/>
+            <a:r>
+              <a:rPr lang="nb-NO" dirty="0"/>
+              <a:t>Higher latency(REQ/ACK signaling)</a:t>
+            </a:r>
+          </a:p>
+          <a:p>
+            <a:pPr lvl="1"/>
+            <a:r>
+              <a:rPr lang="nb-NO" dirty="0"/>
+              <a:t>Possible all pointer bits change per increment</a:t>
             </a:r>
           </a:p>
           <a:p>
@@ -4716,7 +4648,7 @@
             <a:pPr lvl="1"/>
             <a:r>
               <a:rPr lang="nb-NO" dirty="0"/>
-              <a:t>Proven designs exists</a:t>
+              <a:t>Proven design</a:t>
             </a:r>
           </a:p>
           <a:p>
@@ -4730,7 +4662,28 @@
             <a:pPr lvl="1"/>
             <a:r>
               <a:rPr lang="nb-NO" dirty="0"/>
-              <a:t>Tricky full/empty generation</a:t>
+              <a:t>Tricky full/empty /almost_full/almost_empty generation</a:t>
+            </a:r>
+          </a:p>
+          <a:p>
+            <a:pPr lvl="1"/>
+            <a:r>
+              <a:rPr lang="nb-NO" dirty="0"/>
+              <a:t>Larger(4FF per pointer bits)</a:t>
+            </a:r>
+          </a:p>
+          <a:p>
+            <a:pPr lvl="1"/>
+            <a:r>
+              <a:rPr lang="nb-NO" dirty="0"/>
+              <a:t>Lower latency(better performance if full/empty conditions happen often)</a:t>
+            </a:r>
+          </a:p>
+          <a:p>
+            <a:pPr lvl="1"/>
+            <a:r>
+              <a:rPr lang="nb-NO" dirty="0"/>
+              <a:t>Maximum of 1 pointer bit value change per increment</a:t>
             </a:r>
             <a:endParaRPr lang="en-US" dirty="0"/>
           </a:p>
@@ -4776,38 +4729,57 @@
             <p:ph type="title"/>
           </p:nvPr>
         </p:nvSpPr>
-        <p:spPr/>
-        <p:txBody>
-          <a:bodyPr/>
-          <a:lstStyle/>
-          <a:p>
-            <a:endParaRPr lang="en-US"/>
-          </a:p>
-        </p:txBody>
-      </p:sp>
-      <p:sp>
-        <p:nvSpPr>
-          <p:cNvPr id="3" name="Content Placeholder 2"/>
-          <p:cNvSpPr>
-            <a:spLocks noGrp="1"/>
-          </p:cNvSpPr>
+        <p:spPr>
+          <a:xfrm>
+            <a:off x="838200" y="365125"/>
+            <a:ext cx="10515600" cy="1325563"/>
+          </a:xfrm>
+        </p:spPr>
+        <p:txBody>
+          <a:bodyPr/>
+          <a:lstStyle/>
+          <a:p>
+            <a:r>
+              <a:rPr lang="nb-NO" dirty="0"/>
+              <a:t>My implementation: </a:t>
+            </a:r>
+            <a:endParaRPr lang="en-US" dirty="0"/>
+          </a:p>
+        </p:txBody>
+      </p:sp>
+      <p:pic>
+        <p:nvPicPr>
+          <p:cNvPr id="6" name="Content Placeholder 5"/>
+          <p:cNvPicPr>
+            <a:picLocks noGrp="1" noChangeAspect="1"/>
+          </p:cNvPicPr>
           <p:nvPr>
             <p:ph idx="1"/>
           </p:nvPr>
-        </p:nvSpPr>
-        <p:spPr/>
-        <p:txBody>
-          <a:bodyPr/>
-          <a:lstStyle/>
-          <a:p>
-            <a:endParaRPr lang="en-US"/>
-          </a:p>
-        </p:txBody>
-      </p:sp>
+        </p:nvPicPr>
+        <p:blipFill>
+          <a:blip r:embed="rId2">
+            <a:extLst>
+              <a:ext uri="{28A0092B-C50C-407E-A947-70E740481C1C}">
+                <a14:useLocalDpi xmlns:a14="http://schemas.microsoft.com/office/drawing/2010/main" val="0"/>
+              </a:ext>
+            </a:extLst>
+          </a:blip>
+          <a:stretch>
+            <a:fillRect/>
+          </a:stretch>
+        </p:blipFill>
+        <p:spPr>
+          <a:xfrm>
+            <a:off x="796127" y="1253366"/>
+            <a:ext cx="10557673" cy="5167312"/>
+          </a:xfrm>
+        </p:spPr>
+      </p:pic>
     </p:spTree>
     <p:extLst>
       <p:ext uri="{BB962C8B-B14F-4D97-AF65-F5344CB8AC3E}">
-        <p14:creationId xmlns:p14="http://schemas.microsoft.com/office/powerpoint/2010/main" val="2701251838"/>
+        <p14:creationId xmlns:p14="http://schemas.microsoft.com/office/powerpoint/2010/main" val="3684913482"/>
       </p:ext>
     </p:extLst>
   </p:cSld>
@@ -4849,17 +4821,13 @@
           <a:bodyPr/>
           <a:lstStyle/>
           <a:p>
-            <a:r>
-              <a:rPr lang="nb-NO" dirty="0"/>
-              <a:t>My assumptions</a:t>
-            </a:r>
             <a:endParaRPr lang="en-US" dirty="0"/>
           </a:p>
         </p:txBody>
       </p:sp>
       <p:sp>
         <p:nvSpPr>
-          <p:cNvPr id="11" name="Content Placeholder 10"/>
+          <p:cNvPr id="3" name="Content Placeholder 2"/>
           <p:cNvSpPr>
             <a:spLocks noGrp="1"/>
           </p:cNvSpPr>
@@ -4879,7 +4847,7 @@
     </p:spTree>
     <p:extLst>
       <p:ext uri="{BB962C8B-B14F-4D97-AF65-F5344CB8AC3E}">
-        <p14:creationId xmlns:p14="http://schemas.microsoft.com/office/powerpoint/2010/main" val="3684913482"/>
+        <p14:creationId xmlns:p14="http://schemas.microsoft.com/office/powerpoint/2010/main" val="2701251838"/>
       </p:ext>
     </p:extLst>
   </p:cSld>
@@ -5068,30 +5036,6 @@
           <a:xfrm>
             <a:off x="0" y="1144236"/>
             <a:ext cx="12192000" cy="5713764"/>
-          </a:xfrm>
-          <a:prstGeom prst="rect">
-            <a:avLst/>
-          </a:prstGeom>
-        </p:spPr>
-      </p:pic>
-      <p:pic>
-        <p:nvPicPr>
-          <p:cNvPr id="7" name="Picture 6"/>
-          <p:cNvPicPr>
-            <a:picLocks noChangeAspect="1"/>
-          </p:cNvPicPr>
-          <p:nvPr/>
-        </p:nvPicPr>
-        <p:blipFill>
-          <a:blip r:embed="rId3"/>
-          <a:stretch>
-            <a:fillRect/>
-          </a:stretch>
-        </p:blipFill>
-        <p:spPr>
-          <a:xfrm>
-            <a:off x="4350981" y="0"/>
-            <a:ext cx="4206357" cy="3121179"/>
           </a:xfrm>
           <a:prstGeom prst="rect">
             <a:avLst/>
@@ -5241,7 +5185,7 @@
           <a:p>
             <a:r>
               <a:rPr lang="nb-NO" dirty="0"/>
-              <a:t>16 top vs 32 bot	</a:t>
+              <a:t>65536</a:t>
             </a:r>
             <a:endParaRPr lang="en-US" dirty="0"/>
           </a:p>
@@ -5268,7 +5212,7 @@
       </p:sp>
       <p:pic>
         <p:nvPicPr>
-          <p:cNvPr id="4" name="Picture 3"/>
+          <p:cNvPr id="6" name="Picture 5"/>
           <p:cNvPicPr>
             <a:picLocks noChangeAspect="1"/>
           </p:cNvPicPr>
@@ -5282,32 +5226,8 @@
         </p:blipFill>
         <p:spPr>
           <a:xfrm>
-            <a:off x="0" y="4017075"/>
-            <a:ext cx="12192000" cy="2840925"/>
-          </a:xfrm>
-          <a:prstGeom prst="rect">
-            <a:avLst/>
-          </a:prstGeom>
-        </p:spPr>
-      </p:pic>
-      <p:pic>
-        <p:nvPicPr>
-          <p:cNvPr id="5" name="Picture 4"/>
-          <p:cNvPicPr>
-            <a:picLocks noChangeAspect="1"/>
-          </p:cNvPicPr>
-          <p:nvPr/>
-        </p:nvPicPr>
-        <p:blipFill>
-          <a:blip r:embed="rId3"/>
-          <a:stretch>
-            <a:fillRect/>
-          </a:stretch>
-        </p:blipFill>
-        <p:spPr>
-          <a:xfrm>
-            <a:off x="2305051" y="1333121"/>
-            <a:ext cx="9886949" cy="2906298"/>
+            <a:off x="8976049" y="7667"/>
+            <a:ext cx="3215951" cy="6850333"/>
           </a:xfrm>
           <a:prstGeom prst="rect">
             <a:avLst/>
@@ -5317,7 +5237,7 @@
     </p:spTree>
     <p:extLst>
       <p:ext uri="{BB962C8B-B14F-4D97-AF65-F5344CB8AC3E}">
-        <p14:creationId xmlns:p14="http://schemas.microsoft.com/office/powerpoint/2010/main" val="1825209138"/>
+        <p14:creationId xmlns:p14="http://schemas.microsoft.com/office/powerpoint/2010/main" val="3834957508"/>
       </p:ext>
     </p:extLst>
   </p:cSld>

</xml_diff>